<commit_message>
Designed some new stages
</commit_message>
<xml_diff>
--- a/- Stage Design - USPSA.pptx
+++ b/- Stage Design - USPSA.pptx
@@ -258,7 +258,7 @@
               <a:pPr>
                 <a:defRPr/>
               </a:pPr>
-              <a:t>3/14/2019</a:t>
+              <a:t>7/30/2019</a:t>
             </a:fld>
             <a:endParaRPr lang="en-US"/>
           </a:p>
@@ -4159,7 +4159,7 @@
           <p:nvPr>
             <p:extLst>
               <p:ext uri="{D42A27DB-BD31-4B8C-83A1-F6EECF244321}">
-                <p14:modId xmlns:p14="http://schemas.microsoft.com/office/powerpoint/2010/main" val="2207628683"/>
+                <p14:modId xmlns:p14="http://schemas.microsoft.com/office/powerpoint/2010/main" val="200423210"/>
               </p:ext>
             </p:extLst>
           </p:nvPr>
@@ -4555,8 +4555,29 @@
                           <a:ea typeface="Arial" pitchFamily="34"/>
                           <a:cs typeface="Arial" pitchFamily="34"/>
                         </a:rPr>
-                        <a:t>Standing with both feet on X’s, heels against rear fault line</a:t>
+                        <a:t>Standing with both feet on X’s, </a:t>
                       </a:r>
+                      <a:r>
+                        <a:rPr lang="en-US" sz="1100" b="1" i="0" u="none" strike="noStrike" kern="1200" cap="none" spc="0" baseline="0">
+                          <a:solidFill>
+                            <a:srgbClr val="000000"/>
+                          </a:solidFill>
+                          <a:uFillTx/>
+                          <a:latin typeface="Arial" pitchFamily="34"/>
+                          <a:ea typeface="Arial" pitchFamily="34"/>
+                          <a:cs typeface="Arial" pitchFamily="34"/>
+                        </a:rPr>
+                        <a:t>wrists below belt</a:t>
+                      </a:r>
+                      <a:endParaRPr lang="en-US" sz="1100" b="1" i="0" u="none" strike="noStrike" kern="1200" cap="none" spc="0" baseline="0" dirty="0">
+                        <a:solidFill>
+                          <a:srgbClr val="000000"/>
+                        </a:solidFill>
+                        <a:uFillTx/>
+                        <a:latin typeface="Arial" pitchFamily="34"/>
+                        <a:ea typeface="Arial" pitchFamily="34"/>
+                        <a:cs typeface="Arial" pitchFamily="34"/>
+                      </a:endParaRPr>
                     </a:p>
                     <a:p>
                       <a:pPr marL="0" marR="0" lvl="0" indent="0" algn="l" defTabSz="966788" rtl="0" eaLnBrk="1" fontAlgn="base" latinLnBrk="0" hangingPunct="1">
@@ -4706,7 +4727,7 @@
                           <a:ea typeface="Arial" pitchFamily="34"/>
                           <a:cs typeface="Arial" pitchFamily="34"/>
                         </a:rPr>
-                        <a:t>GUN READY CONDITION : Pistol loaded and holstered. PCC shouldered, safety on, pointed at orange cone.</a:t>
+                        <a:t>GUN READY CONDITION : Pistol loaded and holstered. PCC loaded, shouldered, safety on, pointed at orange cone.</a:t>
                       </a:r>
                       <a:endParaRPr kumimoji="0" lang="en-US" sz="1100" b="1" i="0" u="none" strike="noStrike" cap="none" normalizeH="0" baseline="0" dirty="0">
                         <a:ln>

</xml_diff>

<commit_message>
Created 2 new stages
</commit_message>
<xml_diff>
--- a/- Stage Design - USPSA.pptx
+++ b/- Stage Design - USPSA.pptx
@@ -258,7 +258,7 @@
               <a:pPr>
                 <a:defRPr/>
               </a:pPr>
-              <a:t>7/30/2019</a:t>
+              <a:t>8/1/2019</a:t>
             </a:fld>
             <a:endParaRPr lang="en-US"/>
           </a:p>
@@ -4159,7 +4159,7 @@
           <p:nvPr>
             <p:extLst>
               <p:ext uri="{D42A27DB-BD31-4B8C-83A1-F6EECF244321}">
-                <p14:modId xmlns:p14="http://schemas.microsoft.com/office/powerpoint/2010/main" val="200423210"/>
+                <p14:modId xmlns:p14="http://schemas.microsoft.com/office/powerpoint/2010/main" val="2500165314"/>
               </p:ext>
             </p:extLst>
           </p:nvPr>
@@ -4865,37 +4865,7 @@
                           <a:ea typeface="ＭＳ Ｐゴシック" pitchFamily="-112" charset="-128"/>
                           <a:cs typeface="Times New Roman" pitchFamily="-112" charset="0"/>
                         </a:rPr>
-                        <a:t>SCORING:                Comstock</a:t>
-                      </a:r>
-                      <a:r>
-                        <a:rPr kumimoji="0" lang="en-US" sz="1100" b="1" i="0" u="none" strike="noStrike" cap="none" normalizeH="0" baseline="0">
-                          <a:ln>
-                            <a:noFill/>
-                          </a:ln>
-                          <a:solidFill>
-                            <a:schemeClr val="tx1"/>
-                          </a:solidFill>
-                          <a:effectLst/>
-                          <a:latin typeface="Arial" charset="0"/>
-                          <a:ea typeface="ＭＳ Ｐゴシック" pitchFamily="-112" charset="-128"/>
-                          <a:cs typeface="Times New Roman" pitchFamily="-112" charset="0"/>
-                        </a:rPr>
-                        <a:t>, X </a:t>
-                      </a:r>
-                      <a:r>
-                        <a:rPr kumimoji="0" lang="en-US" sz="1100" b="1" i="0" u="none" strike="noStrike" cap="none" normalizeH="0" baseline="0" dirty="0">
-                          <a:ln>
-                            <a:noFill/>
-                          </a:ln>
-                          <a:solidFill>
-                            <a:schemeClr val="tx1"/>
-                          </a:solidFill>
-                          <a:effectLst/>
-                          <a:latin typeface="Arial" charset="0"/>
-                          <a:ea typeface="ＭＳ Ｐゴシック" pitchFamily="-112" charset="-128"/>
-                          <a:cs typeface="Times New Roman" pitchFamily="-112" charset="0"/>
-                        </a:rPr>
-                        <a:t>rounds</a:t>
+                        <a:t>SCORING:                Comstock, X rounds</a:t>
                       </a:r>
                     </a:p>
                     <a:p>
@@ -4928,7 +4898,37 @@
                           <a:ea typeface="ＭＳ Ｐゴシック" pitchFamily="-112" charset="-128"/>
                           <a:cs typeface="Times New Roman" pitchFamily="-112" charset="0"/>
                         </a:rPr>
-                        <a:t>TARGETS:	         X paper,  Steel</a:t>
+                        <a:t>TARGETS:	         X paper</a:t>
+                      </a:r>
+                      <a:r>
+                        <a:rPr kumimoji="0" lang="en-US" sz="1100" b="1" i="0" u="none" strike="noStrike" cap="none" normalizeH="0" baseline="0">
+                          <a:ln>
+                            <a:noFill/>
+                          </a:ln>
+                          <a:solidFill>
+                            <a:schemeClr val="tx1"/>
+                          </a:solidFill>
+                          <a:effectLst/>
+                          <a:latin typeface="Arial" charset="0"/>
+                          <a:ea typeface="ＭＳ Ｐゴシック" pitchFamily="-112" charset="-128"/>
+                          <a:cs typeface="Times New Roman" pitchFamily="-112" charset="0"/>
+                        </a:rPr>
+                        <a:t>, X </a:t>
+                      </a:r>
+                      <a:r>
+                        <a:rPr kumimoji="0" lang="en-US" sz="1100" b="1" i="0" u="none" strike="noStrike" cap="none" normalizeH="0" baseline="0" dirty="0">
+                          <a:ln>
+                            <a:noFill/>
+                          </a:ln>
+                          <a:solidFill>
+                            <a:schemeClr val="tx1"/>
+                          </a:solidFill>
+                          <a:effectLst/>
+                          <a:latin typeface="Arial" charset="0"/>
+                          <a:ea typeface="ＭＳ Ｐゴシック" pitchFamily="-112" charset="-128"/>
+                          <a:cs typeface="Times New Roman" pitchFamily="-112" charset="0"/>
+                        </a:rPr>
+                        <a:t>Steel</a:t>
                       </a:r>
                     </a:p>
                     <a:p>
@@ -5224,144 +5224,6 @@
           </a:graphicData>
         </a:graphic>
       </p:graphicFrame>
-      <p:sp>
-        <p:nvSpPr>
-          <p:cNvPr id="24" name="Line 18"/>
-          <p:cNvSpPr>
-            <a:spLocks noChangeShapeType="1"/>
-          </p:cNvSpPr>
-          <p:nvPr/>
-        </p:nvSpPr>
-        <p:spPr bwMode="auto">
-          <a:xfrm>
-            <a:off x="4559302" y="9294813"/>
-            <a:ext cx="0" cy="0"/>
-          </a:xfrm>
-          <a:prstGeom prst="line">
-            <a:avLst/>
-          </a:prstGeom>
-          <a:noFill/>
-          <a:ln w="12700">
-            <a:solidFill>
-              <a:srgbClr val="000000"/>
-            </a:solidFill>
-            <a:prstDash val="solid"/>
-            <a:round/>
-            <a:headEnd/>
-            <a:tailEnd/>
-          </a:ln>
-          <a:extLst>
-            <a:ext uri="{909E8E84-426E-40DD-AFC4-6F175D3DCCD1}">
-              <a14:hiddenFill xmlns:a14="http://schemas.microsoft.com/office/drawing/2010/main">
-                <a:noFill/>
-              </a14:hiddenFill>
-            </a:ext>
-          </a:extLst>
-        </p:spPr>
-        <p:txBody>
-          <a:bodyPr vert="horz" wrap="square" lIns="91440" tIns="45720" rIns="91440" bIns="45720" numCol="1" anchor="t" anchorCtr="0" compatLnSpc="1">
-            <a:prstTxWarp prst="textNoShape">
-              <a:avLst/>
-            </a:prstTxWarp>
-          </a:bodyPr>
-          <a:lstStyle/>
-          <a:p>
-            <a:endParaRPr lang="en-US"/>
-          </a:p>
-        </p:txBody>
-      </p:sp>
-      <p:sp>
-        <p:nvSpPr>
-          <p:cNvPr id="25" name="Line 19"/>
-          <p:cNvSpPr>
-            <a:spLocks noChangeShapeType="1"/>
-          </p:cNvSpPr>
-          <p:nvPr/>
-        </p:nvSpPr>
-        <p:spPr bwMode="auto">
-          <a:xfrm flipV="1">
-            <a:off x="4559302" y="9291638"/>
-            <a:ext cx="1588" cy="3175"/>
-          </a:xfrm>
-          <a:prstGeom prst="line">
-            <a:avLst/>
-          </a:prstGeom>
-          <a:noFill/>
-          <a:ln w="17463">
-            <a:solidFill>
-              <a:srgbClr val="000000"/>
-            </a:solidFill>
-            <a:prstDash val="solid"/>
-            <a:round/>
-            <a:headEnd/>
-            <a:tailEnd/>
-          </a:ln>
-          <a:extLst>
-            <a:ext uri="{909E8E84-426E-40DD-AFC4-6F175D3DCCD1}">
-              <a14:hiddenFill xmlns:a14="http://schemas.microsoft.com/office/drawing/2010/main">
-                <a:noFill/>
-              </a14:hiddenFill>
-            </a:ext>
-          </a:extLst>
-        </p:spPr>
-        <p:txBody>
-          <a:bodyPr vert="horz" wrap="square" lIns="91440" tIns="45720" rIns="91440" bIns="45720" numCol="1" anchor="t" anchorCtr="0" compatLnSpc="1">
-            <a:prstTxWarp prst="textNoShape">
-              <a:avLst/>
-            </a:prstTxWarp>
-          </a:bodyPr>
-          <a:lstStyle/>
-          <a:p>
-            <a:endParaRPr lang="en-US"/>
-          </a:p>
-        </p:txBody>
-      </p:sp>
-      <p:sp>
-        <p:nvSpPr>
-          <p:cNvPr id="26" name="Line 20"/>
-          <p:cNvSpPr>
-            <a:spLocks noChangeShapeType="1"/>
-          </p:cNvSpPr>
-          <p:nvPr/>
-        </p:nvSpPr>
-        <p:spPr bwMode="auto">
-          <a:xfrm flipV="1">
-            <a:off x="4560889" y="9290050"/>
-            <a:ext cx="0" cy="1588"/>
-          </a:xfrm>
-          <a:prstGeom prst="line">
-            <a:avLst/>
-          </a:prstGeom>
-          <a:noFill/>
-          <a:ln w="12700">
-            <a:solidFill>
-              <a:srgbClr val="000000"/>
-            </a:solidFill>
-            <a:prstDash val="solid"/>
-            <a:round/>
-            <a:headEnd/>
-            <a:tailEnd/>
-          </a:ln>
-          <a:extLst>
-            <a:ext uri="{909E8E84-426E-40DD-AFC4-6F175D3DCCD1}">
-              <a14:hiddenFill xmlns:a14="http://schemas.microsoft.com/office/drawing/2010/main">
-                <a:noFill/>
-              </a14:hiddenFill>
-            </a:ext>
-          </a:extLst>
-        </p:spPr>
-        <p:txBody>
-          <a:bodyPr vert="horz" wrap="square" lIns="91440" tIns="45720" rIns="91440" bIns="45720" numCol="1" anchor="t" anchorCtr="0" compatLnSpc="1">
-            <a:prstTxWarp prst="textNoShape">
-              <a:avLst/>
-            </a:prstTxWarp>
-          </a:bodyPr>
-          <a:lstStyle/>
-          <a:p>
-            <a:endParaRPr lang="en-US"/>
-          </a:p>
-        </p:txBody>
-      </p:sp>
       <p:pic>
         <p:nvPicPr>
           <p:cNvPr id="184" name="Picture 183"/>

</xml_diff>

<commit_message>
Updated some stages, and worked on the WSB's for the ESB stages
</commit_message>
<xml_diff>
--- a/- Stage Design - USPSA.pptx
+++ b/- Stage Design - USPSA.pptx
@@ -5,10 +5,11 @@
     <p:sldMasterId id="2147483648" r:id="rId1"/>
   </p:sldMasterIdLst>
   <p:notesMasterIdLst>
-    <p:notesMasterId r:id="rId3"/>
+    <p:notesMasterId r:id="rId4"/>
   </p:notesMasterIdLst>
   <p:sldIdLst>
     <p:sldId id="274" r:id="rId2"/>
+    <p:sldId id="288" r:id="rId3"/>
   </p:sldIdLst>
   <p:sldSz cx="7315200" cy="9601200"/>
   <p:notesSz cx="6858000" cy="9144000"/>
@@ -258,7 +259,7 @@
               <a:pPr>
                 <a:defRPr/>
               </a:pPr>
-              <a:t>8/1/2019</a:t>
+              <a:t>8/29/2019</a:t>
             </a:fld>
             <a:endParaRPr lang="en-US"/>
           </a:p>
@@ -5313,6 +5314,148 @@
 </p:sld>
 </file>
 
+<file path=ppt/slides/slide2.xml><?xml version="1.0" encoding="utf-8"?>
+<p:sld xmlns:a="http://schemas.openxmlformats.org/drawingml/2006/main" xmlns:r="http://schemas.openxmlformats.org/officeDocument/2006/relationships" xmlns:p="http://schemas.openxmlformats.org/presentationml/2006/main">
+  <p:cSld>
+    <p:spTree>
+      <p:nvGrpSpPr>
+        <p:cNvPr id="1" name=""/>
+        <p:cNvGrpSpPr/>
+        <p:nvPr/>
+      </p:nvGrpSpPr>
+      <p:grpSpPr>
+        <a:xfrm>
+          <a:off x="0" y="0"/>
+          <a:ext cx="0" cy="0"/>
+          <a:chOff x="0" y="0"/>
+          <a:chExt cx="0" cy="0"/>
+        </a:xfrm>
+      </p:grpSpPr>
+      <p:sp>
+        <p:nvSpPr>
+          <p:cNvPr id="2" name="TextBox 1">
+            <a:extLst>
+              <a:ext uri="{FF2B5EF4-FFF2-40B4-BE49-F238E27FC236}">
+                <a16:creationId xmlns:a16="http://schemas.microsoft.com/office/drawing/2014/main" id="{3385E329-E79C-4039-BFCF-DCB1C2897DEA}"/>
+              </a:ext>
+            </a:extLst>
+          </p:cNvPr>
+          <p:cNvSpPr txBox="1"/>
+          <p:nvPr/>
+        </p:nvSpPr>
+        <p:spPr>
+          <a:xfrm>
+            <a:off x="341832" y="384561"/>
+            <a:ext cx="6699903" cy="3416320"/>
+          </a:xfrm>
+          <a:prstGeom prst="rect">
+            <a:avLst/>
+          </a:prstGeom>
+          <a:noFill/>
+        </p:spPr>
+        <p:txBody>
+          <a:bodyPr wrap="square" rtlCol="0">
+            <a:spAutoFit/>
+          </a:bodyPr>
+          <a:lstStyle/>
+          <a:p>
+            <a:pPr algn="ctr"/>
+            <a:r>
+              <a:rPr lang="en-US" b="1" dirty="0"/>
+              <a:t>Stage Name</a:t>
+            </a:r>
+          </a:p>
+          <a:p>
+            <a:pPr algn="ctr"/>
+            <a:r>
+              <a:rPr lang="en-US" b="1" dirty="0"/>
+              <a:t>Written Stage Briefing</a:t>
+            </a:r>
+          </a:p>
+          <a:p>
+            <a:r>
+              <a:rPr lang="en-US" dirty="0"/>
+              <a:t>Stage Name is a </a:t>
+            </a:r>
+            <a:r>
+              <a:rPr lang="en-US" dirty="0" err="1"/>
+              <a:t>RoundCount</a:t>
+            </a:r>
+            <a:r>
+              <a:rPr lang="en-US" dirty="0"/>
+              <a:t> round, Points point, </a:t>
+            </a:r>
+            <a:r>
+              <a:rPr lang="en-US" dirty="0" err="1"/>
+              <a:t>ScoringMethod</a:t>
+            </a:r>
+            <a:r>
+              <a:rPr lang="en-US" dirty="0"/>
+              <a:t> </a:t>
+            </a:r>
+            <a:r>
+              <a:rPr lang="en-US" dirty="0" err="1"/>
+              <a:t>CourseType</a:t>
+            </a:r>
+            <a:r>
+              <a:rPr lang="en-US" dirty="0"/>
+              <a:t> course. Targets. The best </a:t>
+            </a:r>
+            <a:r>
+              <a:rPr lang="en-US" dirty="0" err="1"/>
+              <a:t>HitCount</a:t>
+            </a:r>
+            <a:r>
+              <a:rPr lang="en-US" dirty="0"/>
+              <a:t> hits per target will score. Steel must fall to score. The start signal is audible.</a:t>
+            </a:r>
+          </a:p>
+          <a:p>
+            <a:endParaRPr lang="en-US" dirty="0"/>
+          </a:p>
+          <a:p>
+            <a:r>
+              <a:rPr lang="en-US" dirty="0" err="1"/>
+              <a:t>Hangun</a:t>
+            </a:r>
+            <a:r>
+              <a:rPr lang="en-US" dirty="0"/>
+              <a:t> start position</a:t>
+            </a:r>
+          </a:p>
+          <a:p>
+            <a:endParaRPr lang="en-US" dirty="0"/>
+          </a:p>
+          <a:p>
+            <a:r>
+              <a:rPr lang="en-US" dirty="0"/>
+              <a:t>PCC start position</a:t>
+            </a:r>
+          </a:p>
+          <a:p>
+            <a:endParaRPr lang="en-US" dirty="0"/>
+          </a:p>
+          <a:p>
+            <a:r>
+              <a:rPr lang="en-US" dirty="0"/>
+              <a:t>Stage Procedure</a:t>
+            </a:r>
+          </a:p>
+        </p:txBody>
+      </p:sp>
+    </p:spTree>
+    <p:extLst>
+      <p:ext uri="{BB962C8B-B14F-4D97-AF65-F5344CB8AC3E}">
+        <p14:creationId xmlns:p14="http://schemas.microsoft.com/office/powerpoint/2010/main" val="2536253080"/>
+      </p:ext>
+    </p:extLst>
+  </p:cSld>
+  <p:clrMapOvr>
+    <a:masterClrMapping/>
+  </p:clrMapOvr>
+</p:sld>
+</file>
+
 <file path=ppt/theme/theme1.xml><?xml version="1.0" encoding="utf-8"?>
 <a:theme xmlns:a="http://schemas.openxmlformats.org/drawingml/2006/main" name="Default Design">
   <a:themeElements>

</xml_diff>

<commit_message>
Created another stage, and revised the WSB template.
</commit_message>
<xml_diff>
--- a/- Stage Design - USPSA.pptx
+++ b/- Stage Design - USPSA.pptx
@@ -259,7 +259,7 @@
               <a:pPr>
                 <a:defRPr/>
               </a:pPr>
-              <a:t>8/29/2019</a:t>
+              <a:t>9/6/2019</a:t>
             </a:fld>
             <a:endParaRPr lang="en-US"/>
           </a:p>
@@ -5346,7 +5346,7 @@
         <p:spPr>
           <a:xfrm>
             <a:off x="341832" y="384561"/>
-            <a:ext cx="6699903" cy="3416320"/>
+            <a:ext cx="6699903" cy="2585323"/>
           </a:xfrm>
           <a:prstGeom prst="rect">
             <a:avLst/>
@@ -5374,41 +5374,10 @@
           </a:p>
           <a:p>
             <a:r>
-              <a:rPr lang="en-US" dirty="0"/>
-              <a:t>Stage Name is a </a:t>
-            </a:r>
-            <a:r>
-              <a:rPr lang="en-US" dirty="0" err="1"/>
-              <a:t>RoundCount</a:t>
-            </a:r>
-            <a:r>
-              <a:rPr lang="en-US" dirty="0"/>
-              <a:t> round, Points point, </a:t>
-            </a:r>
-            <a:r>
-              <a:rPr lang="en-US" dirty="0" err="1"/>
-              <a:t>ScoringMethod</a:t>
-            </a:r>
-            <a:r>
-              <a:rPr lang="en-US" dirty="0"/>
-              <a:t> </a:t>
-            </a:r>
-            <a:r>
-              <a:rPr lang="en-US" dirty="0" err="1"/>
-              <a:t>CourseType</a:t>
-            </a:r>
-            <a:r>
-              <a:rPr lang="en-US" dirty="0"/>
-              <a:t> course. Targets. The best </a:t>
-            </a:r>
-            <a:r>
-              <a:rPr lang="en-US" dirty="0" err="1"/>
-              <a:t>HitCount</a:t>
-            </a:r>
-            <a:r>
-              <a:rPr lang="en-US" dirty="0"/>
-              <a:t> hits per target will score. Steel must fall to score. The start signal is audible.</a:t>
-            </a:r>
+              <a:rPr lang="en-US"/>
+              <a:t>Description.</a:t>
+            </a:r>
+            <a:endParaRPr lang="en-US" dirty="0"/>
           </a:p>
           <a:p>
             <a:endParaRPr lang="en-US" dirty="0"/>

</xml_diff>

<commit_message>
Developed some more evil for november
</commit_message>
<xml_diff>
--- a/- Stage Design - USPSA.pptx
+++ b/- Stage Design - USPSA.pptx
@@ -259,7 +259,7 @@
               <a:pPr>
                 <a:defRPr/>
               </a:pPr>
-              <a:t>9/6/2019</a:t>
+              <a:t>10/19/2019</a:t>
             </a:fld>
             <a:endParaRPr lang="en-US"/>
           </a:p>
@@ -5374,22 +5374,21 @@
           </a:p>
           <a:p>
             <a:r>
+              <a:rPr lang="en-US" dirty="0"/>
+              <a:t>Description.</a:t>
+            </a:r>
+          </a:p>
+          <a:p>
+            <a:endParaRPr lang="en-US" dirty="0"/>
+          </a:p>
+          <a:p>
+            <a:r>
               <a:rPr lang="en-US"/>
-              <a:t>Description.</a:t>
-            </a:r>
-            <a:endParaRPr lang="en-US" dirty="0"/>
-          </a:p>
-          <a:p>
-            <a:endParaRPr lang="en-US" dirty="0"/>
-          </a:p>
-          <a:p>
-            <a:r>
-              <a:rPr lang="en-US" dirty="0" err="1"/>
-              <a:t>Hangun</a:t>
+              <a:t>Handgun </a:t>
             </a:r>
             <a:r>
               <a:rPr lang="en-US" dirty="0"/>
-              <a:t> start position</a:t>
+              <a:t>start position</a:t>
             </a:r>
           </a:p>
           <a:p>

</xml_diff>

<commit_message>
Designed more stages for december, set up the steel challenge stuff
</commit_message>
<xml_diff>
--- a/- Stage Design - USPSA.pptx
+++ b/- Stage Design - USPSA.pptx
@@ -259,7 +259,7 @@
               <a:pPr>
                 <a:defRPr/>
               </a:pPr>
-              <a:t>10/19/2019</a:t>
+              <a:t>11/27/2019</a:t>
             </a:fld>
             <a:endParaRPr lang="en-US"/>
           </a:p>
@@ -4160,7 +4160,7 @@
           <p:nvPr>
             <p:extLst>
               <p:ext uri="{D42A27DB-BD31-4B8C-83A1-F6EECF244321}">
-                <p14:modId xmlns:p14="http://schemas.microsoft.com/office/powerpoint/2010/main" val="2500165314"/>
+                <p14:modId xmlns:p14="http://schemas.microsoft.com/office/powerpoint/2010/main" val="3478991792"/>
               </p:ext>
             </p:extLst>
           </p:nvPr>
@@ -4728,7 +4728,7 @@
                           <a:ea typeface="Arial" pitchFamily="34"/>
                           <a:cs typeface="Arial" pitchFamily="34"/>
                         </a:rPr>
-                        <a:t>GUN READY CONDITION : Pistol loaded and holstered. PCC loaded, shouldered, safety on, pointed at orange cone.</a:t>
+                        <a:t>GUN READY CONDITION : Pistol loaded and holstered. PCC loaded, held with both hands, shouldered, safety on, pointed at orange cone.</a:t>
                       </a:r>
                       <a:endParaRPr kumimoji="0" lang="en-US" sz="1100" b="1" i="0" u="none" strike="noStrike" cap="none" normalizeH="0" baseline="0" dirty="0">
                         <a:ln>

</xml_diff>